<commit_message>
Updated REST API Slides
Updated REST API slides
</commit_message>
<xml_diff>
--- a/REST-API.pptx
+++ b/REST-API.pptx
@@ -6,7 +6,7 @@
     <p:sldMasterId id="2147483660" r:id="rId2"/>
   </p:sldMasterIdLst>
   <p:notesMasterIdLst>
-    <p:notesMasterId r:id="rId10"/>
+    <p:notesMasterId r:id="rId11"/>
   </p:notesMasterIdLst>
   <p:sldIdLst>
     <p:sldId id="256" r:id="rId3"/>
@@ -16,6 +16,7 @@
     <p:sldId id="289" r:id="rId7"/>
     <p:sldId id="290" r:id="rId8"/>
     <p:sldId id="291" r:id="rId9"/>
+    <p:sldId id="292" r:id="rId10"/>
   </p:sldIdLst>
   <p:sldSz cx="12192000" cy="6858000"/>
   <p:notesSz cx="6858000" cy="9144000"/>
@@ -204,7 +205,7 @@
           <a:p>
             <a:fld id="{4C808618-C8B0-40F0-9017-1C7EBDB69449}" type="datetimeFigureOut">
               <a:rPr lang="en-IN" smtClean="0"/>
-              <a:t>28-04-2024</a:t>
+              <a:t>29-04-2024</a:t>
             </a:fld>
             <a:endParaRPr lang="en-IN"/>
           </a:p>
@@ -1060,6 +1061,90 @@
 </p:notes>
 </file>
 
+<file path=ppt/notesSlides/notesSlide8.xml><?xml version="1.0" encoding="utf-8"?>
+<p:notes xmlns:a="http://schemas.openxmlformats.org/drawingml/2006/main" xmlns:r="http://schemas.openxmlformats.org/officeDocument/2006/relationships" xmlns:p="http://schemas.openxmlformats.org/presentationml/2006/main">
+  <p:cSld>
+    <p:spTree>
+      <p:nvGrpSpPr>
+        <p:cNvPr id="1" name=""/>
+        <p:cNvGrpSpPr/>
+        <p:nvPr/>
+      </p:nvGrpSpPr>
+      <p:grpSpPr>
+        <a:xfrm>
+          <a:off x="0" y="0"/>
+          <a:ext cx="0" cy="0"/>
+          <a:chOff x="0" y="0"/>
+          <a:chExt cx="0" cy="0"/>
+        </a:xfrm>
+      </p:grpSpPr>
+      <p:sp>
+        <p:nvSpPr>
+          <p:cNvPr id="2" name="Slide Image Placeholder 1"/>
+          <p:cNvSpPr>
+            <a:spLocks noGrp="1" noRot="1" noChangeAspect="1"/>
+          </p:cNvSpPr>
+          <p:nvPr>
+            <p:ph type="sldImg"/>
+          </p:nvPr>
+        </p:nvSpPr>
+        <p:spPr/>
+      </p:sp>
+      <p:sp>
+        <p:nvSpPr>
+          <p:cNvPr id="3" name="Notes Placeholder 2"/>
+          <p:cNvSpPr>
+            <a:spLocks noGrp="1"/>
+          </p:cNvSpPr>
+          <p:nvPr>
+            <p:ph type="body" idx="1"/>
+          </p:nvPr>
+        </p:nvSpPr>
+        <p:spPr/>
+        <p:txBody>
+          <a:bodyPr/>
+          <a:lstStyle/>
+          <a:p>
+            <a:endParaRPr lang="en-IN" dirty="0"/>
+          </a:p>
+        </p:txBody>
+      </p:sp>
+      <p:sp>
+        <p:nvSpPr>
+          <p:cNvPr id="4" name="Slide Number Placeholder 3"/>
+          <p:cNvSpPr>
+            <a:spLocks noGrp="1"/>
+          </p:cNvSpPr>
+          <p:nvPr>
+            <p:ph type="sldNum" sz="quarter" idx="5"/>
+          </p:nvPr>
+        </p:nvSpPr>
+        <p:spPr/>
+        <p:txBody>
+          <a:bodyPr/>
+          <a:lstStyle/>
+          <a:p>
+            <a:fld id="{FEDE751B-76C5-481C-AB63-DB23DC186751}" type="slidenum">
+              <a:rPr lang="en-IN" smtClean="0"/>
+              <a:t>8</a:t>
+            </a:fld>
+            <a:endParaRPr lang="en-IN"/>
+          </a:p>
+        </p:txBody>
+      </p:sp>
+    </p:spTree>
+    <p:extLst>
+      <p:ext uri="{BB962C8B-B14F-4D97-AF65-F5344CB8AC3E}">
+        <p14:creationId xmlns:p14="http://schemas.microsoft.com/office/powerpoint/2010/main" val="2697124323"/>
+      </p:ext>
+    </p:extLst>
+  </p:cSld>
+  <p:clrMapOvr>
+    <a:masterClrMapping/>
+  </p:clrMapOvr>
+</p:notes>
+</file>
+
 <file path=ppt/slideLayouts/slideLayout1.xml><?xml version="1.0" encoding="utf-8"?>
 <p:sldLayout xmlns:a="http://schemas.openxmlformats.org/drawingml/2006/main" xmlns:r="http://schemas.openxmlformats.org/officeDocument/2006/relationships" xmlns:p="http://schemas.openxmlformats.org/presentationml/2006/main" preserve="1" userDrawn="1">
   <p:cSld name="8_Blank">
@@ -1702,7 +1787,7 @@
           <a:p>
             <a:fld id="{09D1E4F4-F565-418F-BE5C-A28479FEFE1C}" type="datetimeFigureOut">
               <a:rPr lang="en-IN" smtClean="0"/>
-              <a:t>28-04-2024</a:t>
+              <a:t>29-04-2024</a:t>
             </a:fld>
             <a:endParaRPr lang="en-IN"/>
           </a:p>
@@ -1924,7 +2009,7 @@
           <a:p>
             <a:fld id="{DCD93FCB-1712-4C32-B8CE-9D93E0954E9A}" type="datetimeFigureOut">
               <a:rPr lang="en-IN" smtClean="0"/>
-              <a:t>28-04-2024</a:t>
+              <a:t>29-04-2024</a:t>
             </a:fld>
             <a:endParaRPr lang="en-IN"/>
           </a:p>
@@ -2037,7 +2122,7 @@
           <a:p>
             <a:fld id="{DCD93FCB-1712-4C32-B8CE-9D93E0954E9A}" type="datetimeFigureOut">
               <a:rPr lang="en-IN" smtClean="0"/>
-              <a:t>28-04-2024</a:t>
+              <a:t>29-04-2024</a:t>
             </a:fld>
             <a:endParaRPr lang="en-IN"/>
           </a:p>
@@ -2350,7 +2435,7 @@
           <a:p>
             <a:fld id="{DCD93FCB-1712-4C32-B8CE-9D93E0954E9A}" type="datetimeFigureOut">
               <a:rPr lang="en-IN" smtClean="0"/>
-              <a:t>28-04-2024</a:t>
+              <a:t>29-04-2024</a:t>
             </a:fld>
             <a:endParaRPr lang="en-IN"/>
           </a:p>
@@ -2639,7 +2724,7 @@
           <a:p>
             <a:fld id="{DCD93FCB-1712-4C32-B8CE-9D93E0954E9A}" type="datetimeFigureOut">
               <a:rPr lang="en-IN" smtClean="0"/>
-              <a:t>28-04-2024</a:t>
+              <a:t>29-04-2024</a:t>
             </a:fld>
             <a:endParaRPr lang="en-IN"/>
           </a:p>
@@ -2839,7 +2924,7 @@
           <a:p>
             <a:fld id="{DCD93FCB-1712-4C32-B8CE-9D93E0954E9A}" type="datetimeFigureOut">
               <a:rPr lang="en-IN" smtClean="0"/>
-              <a:t>28-04-2024</a:t>
+              <a:t>29-04-2024</a:t>
             </a:fld>
             <a:endParaRPr lang="en-IN"/>
           </a:p>
@@ -3049,7 +3134,7 @@
           <a:p>
             <a:fld id="{DCD93FCB-1712-4C32-B8CE-9D93E0954E9A}" type="datetimeFigureOut">
               <a:rPr lang="en-IN" smtClean="0"/>
-              <a:t>28-04-2024</a:t>
+              <a:t>29-04-2024</a:t>
             </a:fld>
             <a:endParaRPr lang="en-IN"/>
           </a:p>
@@ -3162,7 +3247,7 @@
           <a:p>
             <a:fld id="{09D1E4F4-F565-418F-BE5C-A28479FEFE1C}" type="datetimeFigureOut">
               <a:rPr lang="en-IN" smtClean="0"/>
-              <a:t>28-04-2024</a:t>
+              <a:t>29-04-2024</a:t>
             </a:fld>
             <a:endParaRPr lang="en-IN"/>
           </a:p>
@@ -3275,7 +3360,7 @@
           <a:p>
             <a:fld id="{09D1E4F4-F565-418F-BE5C-A28479FEFE1C}" type="datetimeFigureOut">
               <a:rPr lang="en-IN" smtClean="0"/>
-              <a:t>28-04-2024</a:t>
+              <a:t>29-04-2024</a:t>
             </a:fld>
             <a:endParaRPr lang="en-IN"/>
           </a:p>
@@ -3668,7 +3753,7 @@
           <a:p>
             <a:fld id="{09D1E4F4-F565-418F-BE5C-A28479FEFE1C}" type="datetimeFigureOut">
               <a:rPr lang="en-IN" smtClean="0"/>
-              <a:t>28-04-2024</a:t>
+              <a:t>29-04-2024</a:t>
             </a:fld>
             <a:endParaRPr lang="en-IN"/>
           </a:p>
@@ -3818,7 +3903,7 @@
           <a:p>
             <a:fld id="{09D1E4F4-F565-418F-BE5C-A28479FEFE1C}" type="datetimeFigureOut">
               <a:rPr lang="en-IN" smtClean="0"/>
-              <a:t>28-04-2024</a:t>
+              <a:t>29-04-2024</a:t>
             </a:fld>
             <a:endParaRPr lang="en-IN"/>
           </a:p>
@@ -3931,7 +4016,7 @@
           <a:p>
             <a:fld id="{09D1E4F4-F565-418F-BE5C-A28479FEFE1C}" type="datetimeFigureOut">
               <a:rPr lang="en-IN" smtClean="0"/>
-              <a:t>28-04-2024</a:t>
+              <a:t>29-04-2024</a:t>
             </a:fld>
             <a:endParaRPr lang="en-IN"/>
           </a:p>
@@ -4253,7 +4338,7 @@
           <a:p>
             <a:fld id="{09D1E4F4-F565-418F-BE5C-A28479FEFE1C}" type="datetimeFigureOut">
               <a:rPr lang="en-IN" smtClean="0"/>
-              <a:t>28-04-2024</a:t>
+              <a:t>29-04-2024</a:t>
             </a:fld>
             <a:endParaRPr lang="en-IN"/>
           </a:p>
@@ -4551,7 +4636,7 @@
           <a:p>
             <a:fld id="{09D1E4F4-F565-418F-BE5C-A28479FEFE1C}" type="datetimeFigureOut">
               <a:rPr lang="en-IN" smtClean="0"/>
-              <a:t>28-04-2024</a:t>
+              <a:t>29-04-2024</a:t>
             </a:fld>
             <a:endParaRPr lang="en-IN"/>
           </a:p>
@@ -4767,7 +4852,7 @@
           <a:p>
             <a:fld id="{09D1E4F4-F565-418F-BE5C-A28479FEFE1C}" type="datetimeFigureOut">
               <a:rPr lang="en-IN" smtClean="0"/>
-              <a:t>28-04-2024</a:t>
+              <a:t>29-04-2024</a:t>
             </a:fld>
             <a:endParaRPr lang="en-IN"/>
           </a:p>
@@ -4903,7 +4988,7 @@
           <a:p>
             <a:fld id="{09D1E4F4-F565-418F-BE5C-A28479FEFE1C}" type="datetimeFigureOut">
               <a:rPr lang="en-IN" smtClean="0"/>
-              <a:t>28-04-2024</a:t>
+              <a:t>29-04-2024</a:t>
             </a:fld>
             <a:endParaRPr lang="en-IN"/>
           </a:p>
@@ -6105,7 +6190,7 @@
           <a:p>
             <a:fld id="{DCD93FCB-1712-4C32-B8CE-9D93E0954E9A}" type="datetimeFigureOut">
               <a:rPr lang="en-IN" smtClean="0"/>
-              <a:t>28-04-2024</a:t>
+              <a:t>29-04-2024</a:t>
             </a:fld>
             <a:endParaRPr lang="en-IN"/>
           </a:p>
@@ -7512,11 +7597,11 @@
   <p:clrMapOvr>
     <a:masterClrMapping/>
   </p:clrMapOvr>
-  <mc:AlternateContent xmlns:mc="http://schemas.openxmlformats.org/markup-compatibility/2006">
-    <mc:Choice xmlns:p14="http://schemas.microsoft.com/office/powerpoint/2010/main" Requires="p14">
+  <mc:AlternateContent xmlns:mc="http://schemas.openxmlformats.org/markup-compatibility/2006" xmlns:p14="http://schemas.microsoft.com/office/powerpoint/2010/main">
+    <mc:Choice Requires="p14">
       <p:transition spd="slow" p14:dur="2000" advTm="13235"/>
     </mc:Choice>
-    <mc:Fallback>
+    <mc:Fallback xmlns="">
       <p:transition spd="slow" advTm="13235"/>
     </mc:Fallback>
   </mc:AlternateContent>
@@ -9156,11 +9241,11 @@
   <p:clrMapOvr>
     <a:masterClrMapping/>
   </p:clrMapOvr>
-  <mc:AlternateContent xmlns:mc="http://schemas.openxmlformats.org/markup-compatibility/2006">
-    <mc:Choice xmlns:p14="http://schemas.microsoft.com/office/powerpoint/2010/main" Requires="p14">
+  <mc:AlternateContent xmlns:mc="http://schemas.openxmlformats.org/markup-compatibility/2006" xmlns:p14="http://schemas.microsoft.com/office/powerpoint/2010/main">
+    <mc:Choice Requires="p14">
       <p:transition spd="slow" p14:dur="2000" advTm="13235"/>
     </mc:Choice>
-    <mc:Fallback>
+    <mc:Fallback xmlns="">
       <p:transition spd="slow" advTm="13235"/>
     </mc:Fallback>
   </mc:AlternateContent>
@@ -10295,11 +10380,11 @@
   <p:clrMapOvr>
     <a:masterClrMapping/>
   </p:clrMapOvr>
-  <mc:AlternateContent xmlns:mc="http://schemas.openxmlformats.org/markup-compatibility/2006">
-    <mc:Choice xmlns:p14="http://schemas.microsoft.com/office/powerpoint/2010/main" Requires="p14">
+  <mc:AlternateContent xmlns:mc="http://schemas.openxmlformats.org/markup-compatibility/2006" xmlns:p14="http://schemas.microsoft.com/office/powerpoint/2010/main">
+    <mc:Choice Requires="p14">
       <p:transition spd="slow" p14:dur="2000" advTm="13235"/>
     </mc:Choice>
-    <mc:Fallback>
+    <mc:Fallback xmlns="">
       <p:transition spd="slow" advTm="13235"/>
     </mc:Fallback>
   </mc:AlternateContent>
@@ -11060,6 +11145,636 @@
     <p:extLst>
       <p:ext uri="{BB962C8B-B14F-4D97-AF65-F5344CB8AC3E}">
         <p14:creationId xmlns:p14="http://schemas.microsoft.com/office/powerpoint/2010/main" val="694523487"/>
+      </p:ext>
+    </p:extLst>
+  </p:cSld>
+  <p:clrMapOvr>
+    <a:masterClrMapping/>
+  </p:clrMapOvr>
+  <mc:AlternateContent xmlns:mc="http://schemas.openxmlformats.org/markup-compatibility/2006" xmlns:p14="http://schemas.microsoft.com/office/powerpoint/2010/main">
+    <mc:Choice Requires="p14">
+      <p:transition spd="slow" p14:dur="2000" advTm="13235"/>
+    </mc:Choice>
+    <mc:Fallback xmlns="">
+      <p:transition spd="slow" advTm="13235"/>
+    </mc:Fallback>
+  </mc:AlternateContent>
+</p:sld>
+</file>
+
+<file path=ppt/slides/slide8.xml><?xml version="1.0" encoding="utf-8"?>
+<p:sld xmlns:a="http://schemas.openxmlformats.org/drawingml/2006/main" xmlns:r="http://schemas.openxmlformats.org/officeDocument/2006/relationships" xmlns:p="http://schemas.openxmlformats.org/presentationml/2006/main">
+  <p:cSld>
+    <p:spTree>
+      <p:nvGrpSpPr>
+        <p:cNvPr id="1" name=""/>
+        <p:cNvGrpSpPr/>
+        <p:nvPr/>
+      </p:nvGrpSpPr>
+      <p:grpSpPr>
+        <a:xfrm>
+          <a:off x="0" y="0"/>
+          <a:ext cx="0" cy="0"/>
+          <a:chOff x="0" y="0"/>
+          <a:chExt cx="0" cy="0"/>
+        </a:xfrm>
+      </p:grpSpPr>
+      <p:sp>
+        <p:nvSpPr>
+          <p:cNvPr id="4" name="TextBox 3">
+            <a:extLst>
+              <a:ext uri="{FF2B5EF4-FFF2-40B4-BE49-F238E27FC236}">
+                <a16:creationId xmlns:a16="http://schemas.microsoft.com/office/drawing/2014/main" id="{B5782367-699C-45C2-9B8F-67296C29D982}"/>
+              </a:ext>
+            </a:extLst>
+          </p:cNvPr>
+          <p:cNvSpPr txBox="1"/>
+          <p:nvPr/>
+        </p:nvSpPr>
+        <p:spPr>
+          <a:xfrm>
+            <a:off x="113512" y="94594"/>
+            <a:ext cx="10657489" cy="584775"/>
+          </a:xfrm>
+          <a:prstGeom prst="rect">
+            <a:avLst/>
+          </a:prstGeom>
+          <a:noFill/>
+        </p:spPr>
+        <p:txBody>
+          <a:bodyPr wrap="square" rtlCol="0">
+            <a:spAutoFit/>
+          </a:bodyPr>
+          <a:lstStyle/>
+          <a:p>
+            <a:r>
+              <a:rPr lang="en-IN" sz="3200" dirty="0"/>
+              <a:t>REST API – Exception Handling</a:t>
+            </a:r>
+          </a:p>
+        </p:txBody>
+      </p:sp>
+      <p:sp>
+        <p:nvSpPr>
+          <p:cNvPr id="2" name="TextBox 1">
+            <a:extLst>
+              <a:ext uri="{FF2B5EF4-FFF2-40B4-BE49-F238E27FC236}">
+                <a16:creationId xmlns:a16="http://schemas.microsoft.com/office/drawing/2014/main" id="{E99035F5-C1A4-4EEB-9D17-BFD8DFE91C54}"/>
+              </a:ext>
+            </a:extLst>
+          </p:cNvPr>
+          <p:cNvSpPr txBox="1"/>
+          <p:nvPr/>
+        </p:nvSpPr>
+        <p:spPr>
+          <a:xfrm>
+            <a:off x="220980" y="982980"/>
+            <a:ext cx="4351020" cy="954107"/>
+          </a:xfrm>
+          <a:prstGeom prst="rect">
+            <a:avLst/>
+          </a:prstGeom>
+          <a:noFill/>
+        </p:spPr>
+        <p:txBody>
+          <a:bodyPr wrap="square" rtlCol="0">
+            <a:spAutoFit/>
+          </a:bodyPr>
+          <a:lstStyle/>
+          <a:p>
+            <a:endParaRPr lang="en-IN" sz="2800" dirty="0">
+              <a:latin typeface="Calibri" panose="020F0502020204030204" pitchFamily="34" charset="0"/>
+            </a:endParaRPr>
+          </a:p>
+          <a:p>
+            <a:pPr marL="285750" indent="-285750">
+              <a:buFont typeface="Arial" panose="020B0604020202020204" pitchFamily="34" charset="0"/>
+              <a:buChar char="•"/>
+            </a:pPr>
+            <a:endParaRPr lang="en-IN" sz="2800" dirty="0"/>
+          </a:p>
+        </p:txBody>
+      </p:sp>
+      <p:sp>
+        <p:nvSpPr>
+          <p:cNvPr id="7" name="TextBox 6">
+            <a:extLst>
+              <a:ext uri="{FF2B5EF4-FFF2-40B4-BE49-F238E27FC236}">
+                <a16:creationId xmlns:a16="http://schemas.microsoft.com/office/drawing/2014/main" id="{164DB29F-2E65-62FB-720F-57E4BA0652D2}"/>
+              </a:ext>
+            </a:extLst>
+          </p:cNvPr>
+          <p:cNvSpPr txBox="1"/>
+          <p:nvPr/>
+        </p:nvSpPr>
+        <p:spPr>
+          <a:xfrm>
+            <a:off x="113512" y="747556"/>
+            <a:ext cx="11916563" cy="584775"/>
+          </a:xfrm>
+          <a:prstGeom prst="rect">
+            <a:avLst/>
+          </a:prstGeom>
+          <a:noFill/>
+        </p:spPr>
+        <p:txBody>
+          <a:bodyPr wrap="square" rtlCol="0">
+            <a:spAutoFit/>
+          </a:bodyPr>
+          <a:lstStyle/>
+          <a:p>
+            <a:r>
+              <a:rPr lang="en-IN" sz="1600" b="0" i="0" dirty="0">
+                <a:solidFill>
+                  <a:srgbClr val="0D0D0D"/>
+                </a:solidFill>
+                <a:effectLst/>
+                <a:highlight>
+                  <a:srgbClr val="FFFFFF"/>
+                </a:highlight>
+                <a:latin typeface="Söhne"/>
+              </a:rPr>
+              <a:t>Exception handling in REST APIs is crucial for providing informative and meaningful responses to clients when errors occur. Based on response, client should be able to understand what exactl</a:t>
+            </a:r>
+            <a:r>
+              <a:rPr lang="en-IN" sz="1600" dirty="0">
+                <a:solidFill>
+                  <a:srgbClr val="0D0D0D"/>
+                </a:solidFill>
+                <a:highlight>
+                  <a:srgbClr val="FFFFFF"/>
+                </a:highlight>
+                <a:latin typeface="Söhne"/>
+              </a:rPr>
+              <a:t>y went wrong and fix issues quickly with the information provided</a:t>
+            </a:r>
+            <a:r>
+              <a:rPr lang="en-IN" sz="1600" b="0" i="0" dirty="0">
+                <a:solidFill>
+                  <a:srgbClr val="0D0D0D"/>
+                </a:solidFill>
+                <a:effectLst/>
+                <a:highlight>
+                  <a:srgbClr val="FFFFFF"/>
+                </a:highlight>
+                <a:latin typeface="Söhne"/>
+              </a:rPr>
+              <a:t> </a:t>
+            </a:r>
+          </a:p>
+        </p:txBody>
+      </p:sp>
+      <p:sp>
+        <p:nvSpPr>
+          <p:cNvPr id="5" name="TextBox 4">
+            <a:extLst>
+              <a:ext uri="{FF2B5EF4-FFF2-40B4-BE49-F238E27FC236}">
+                <a16:creationId xmlns:a16="http://schemas.microsoft.com/office/drawing/2014/main" id="{10A84866-10B7-B18A-B7D7-B5FCD4F316B3}"/>
+              </a:ext>
+            </a:extLst>
+          </p:cNvPr>
+          <p:cNvSpPr txBox="1"/>
+          <p:nvPr/>
+        </p:nvSpPr>
+        <p:spPr>
+          <a:xfrm>
+            <a:off x="113512" y="1332331"/>
+            <a:ext cx="5644351" cy="400110"/>
+          </a:xfrm>
+          <a:prstGeom prst="rect">
+            <a:avLst/>
+          </a:prstGeom>
+          <a:noFill/>
+        </p:spPr>
+        <p:txBody>
+          <a:bodyPr wrap="square" rtlCol="0">
+            <a:spAutoFit/>
+          </a:bodyPr>
+          <a:lstStyle/>
+          <a:p>
+            <a:r>
+              <a:rPr lang="en-IN" sz="2000" b="1" dirty="0">
+                <a:latin typeface="Calibri" panose="020F0502020204030204" pitchFamily="34" charset="0"/>
+              </a:rPr>
+              <a:t>Best Practices for Exception Handling</a:t>
+            </a:r>
+          </a:p>
+        </p:txBody>
+      </p:sp>
+      <p:sp>
+        <p:nvSpPr>
+          <p:cNvPr id="8" name="TextBox 7">
+            <a:extLst>
+              <a:ext uri="{FF2B5EF4-FFF2-40B4-BE49-F238E27FC236}">
+                <a16:creationId xmlns:a16="http://schemas.microsoft.com/office/drawing/2014/main" id="{13F6F531-B155-9C38-C859-A76364CA2148}"/>
+              </a:ext>
+            </a:extLst>
+          </p:cNvPr>
+          <p:cNvSpPr txBox="1"/>
+          <p:nvPr/>
+        </p:nvSpPr>
+        <p:spPr>
+          <a:xfrm>
+            <a:off x="113512" y="1732441"/>
+            <a:ext cx="11788130" cy="4031873"/>
+          </a:xfrm>
+          <a:prstGeom prst="rect">
+            <a:avLst/>
+          </a:prstGeom>
+          <a:noFill/>
+        </p:spPr>
+        <p:txBody>
+          <a:bodyPr wrap="square" rtlCol="0">
+            <a:spAutoFit/>
+          </a:bodyPr>
+          <a:lstStyle/>
+          <a:p>
+            <a:pPr marL="285750" indent="-285750">
+              <a:buFont typeface="Arial" panose="020B0604020202020204" pitchFamily="34" charset="0"/>
+              <a:buChar char="•"/>
+            </a:pPr>
+            <a:r>
+              <a:rPr lang="en-IN" sz="1600" b="1" i="0" dirty="0">
+                <a:solidFill>
+                  <a:srgbClr val="0D0D0D"/>
+                </a:solidFill>
+                <a:effectLst/>
+                <a:highlight>
+                  <a:srgbClr val="FFFFFF"/>
+                </a:highlight>
+                <a:latin typeface="Söhne"/>
+              </a:rPr>
+              <a:t>Define Standard Error Responses or Status Codes: </a:t>
+            </a:r>
+            <a:r>
+              <a:rPr lang="en-IN" sz="1600" b="0" i="0" dirty="0">
+                <a:solidFill>
+                  <a:srgbClr val="0D0D0D"/>
+                </a:solidFill>
+                <a:effectLst/>
+                <a:highlight>
+                  <a:srgbClr val="FFFFFF"/>
+                </a:highlight>
+                <a:latin typeface="Söhne"/>
+              </a:rPr>
+              <a:t>Establish a set of standard error responses with corresponding HTTP status codes. For example:</a:t>
+            </a:r>
+          </a:p>
+          <a:p>
+            <a:pPr marL="742950" lvl="1" indent="-285750">
+              <a:buFont typeface="Arial" panose="020B0604020202020204" pitchFamily="34" charset="0"/>
+              <a:buChar char="•"/>
+            </a:pPr>
+            <a:r>
+              <a:rPr lang="en-IN" sz="1600" dirty="0">
+                <a:solidFill>
+                  <a:srgbClr val="0D0D0D"/>
+                </a:solidFill>
+                <a:highlight>
+                  <a:srgbClr val="FFFFFF"/>
+                </a:highlight>
+                <a:latin typeface="Söhne"/>
+              </a:rPr>
+              <a:t>400 – Bad Request – Invalid or malformed input</a:t>
+            </a:r>
+          </a:p>
+          <a:p>
+            <a:pPr marL="742950" lvl="1" indent="-285750">
+              <a:buFont typeface="Arial" panose="020B0604020202020204" pitchFamily="34" charset="0"/>
+              <a:buChar char="•"/>
+            </a:pPr>
+            <a:r>
+              <a:rPr lang="en-IN" sz="1600" i="0" dirty="0">
+                <a:solidFill>
+                  <a:srgbClr val="0D0D0D"/>
+                </a:solidFill>
+                <a:effectLst/>
+                <a:highlight>
+                  <a:srgbClr val="FFFFFF"/>
+                </a:highlight>
+                <a:latin typeface="Söhne"/>
+              </a:rPr>
+              <a:t>401 </a:t>
+            </a:r>
+            <a:r>
+              <a:rPr lang="en-IN" sz="1600" dirty="0">
+                <a:solidFill>
+                  <a:srgbClr val="0D0D0D"/>
+                </a:solidFill>
+                <a:highlight>
+                  <a:srgbClr val="FFFFFF"/>
+                </a:highlight>
+                <a:latin typeface="Söhne"/>
+              </a:rPr>
+              <a:t>– Unauthorized – Authentication is required or invalid credentials</a:t>
+            </a:r>
+          </a:p>
+          <a:p>
+            <a:pPr marL="742950" lvl="1" indent="-285750">
+              <a:buFont typeface="Arial" panose="020B0604020202020204" pitchFamily="34" charset="0"/>
+              <a:buChar char="•"/>
+            </a:pPr>
+            <a:r>
+              <a:rPr lang="en-IN" sz="1600" i="0" dirty="0">
+                <a:solidFill>
+                  <a:srgbClr val="0D0D0D"/>
+                </a:solidFill>
+                <a:effectLst/>
+                <a:highlight>
+                  <a:srgbClr val="FFFFFF"/>
+                </a:highlight>
+                <a:latin typeface="Söhne"/>
+              </a:rPr>
+              <a:t>404 – Not Found – Requested </a:t>
+            </a:r>
+            <a:r>
+              <a:rPr lang="en-IN" sz="1600" dirty="0">
+                <a:solidFill>
+                  <a:srgbClr val="0D0D0D"/>
+                </a:solidFill>
+                <a:highlight>
+                  <a:srgbClr val="FFFFFF"/>
+                </a:highlight>
+                <a:latin typeface="Söhne"/>
+              </a:rPr>
+              <a:t>Resource not found</a:t>
+            </a:r>
+          </a:p>
+          <a:p>
+            <a:pPr marL="742950" lvl="1" indent="-285750">
+              <a:buFont typeface="Arial" panose="020B0604020202020204" pitchFamily="34" charset="0"/>
+              <a:buChar char="•"/>
+            </a:pPr>
+            <a:r>
+              <a:rPr lang="en-IN" sz="1600" i="0" dirty="0">
+                <a:solidFill>
+                  <a:srgbClr val="0D0D0D"/>
+                </a:solidFill>
+                <a:effectLst/>
+                <a:highlight>
+                  <a:srgbClr val="FFFFFF"/>
+                </a:highlight>
+                <a:latin typeface="Söhne"/>
+              </a:rPr>
+              <a:t>500 – Internal Server Error – Unexpected server error while processing the request</a:t>
+            </a:r>
+          </a:p>
+          <a:p>
+            <a:pPr lvl="1"/>
+            <a:endParaRPr lang="en-IN" sz="1600" dirty="0">
+              <a:solidFill>
+                <a:srgbClr val="0D0D0D"/>
+              </a:solidFill>
+              <a:highlight>
+                <a:srgbClr val="FFFFFF"/>
+              </a:highlight>
+              <a:latin typeface="Söhne"/>
+            </a:endParaRPr>
+          </a:p>
+          <a:p>
+            <a:pPr marL="285750" indent="-285750">
+              <a:buFont typeface="Arial" panose="020B0604020202020204" pitchFamily="34" charset="0"/>
+              <a:buChar char="•"/>
+            </a:pPr>
+            <a:r>
+              <a:rPr lang="en-IN" sz="1600" b="1" i="0" dirty="0">
+                <a:solidFill>
+                  <a:srgbClr val="0D0D0D"/>
+                </a:solidFill>
+                <a:effectLst/>
+                <a:highlight>
+                  <a:srgbClr val="FFFFFF"/>
+                </a:highlight>
+                <a:latin typeface="Söhne"/>
+              </a:rPr>
+              <a:t>Provide De</a:t>
+            </a:r>
+            <a:r>
+              <a:rPr lang="en-IN" sz="1600" b="1" dirty="0">
+                <a:solidFill>
+                  <a:srgbClr val="0D0D0D"/>
+                </a:solidFill>
+                <a:highlight>
+                  <a:srgbClr val="FFFFFF"/>
+                </a:highlight>
+                <a:latin typeface="Söhne"/>
+              </a:rPr>
+              <a:t>tail Error Messages: I</a:t>
+            </a:r>
+            <a:r>
+              <a:rPr lang="en-IN" sz="1600" b="0" i="0" dirty="0">
+                <a:solidFill>
+                  <a:srgbClr val="0D0D0D"/>
+                </a:solidFill>
+                <a:effectLst/>
+                <a:highlight>
+                  <a:srgbClr val="FFFFFF"/>
+                </a:highlight>
+                <a:latin typeface="Söhne"/>
+              </a:rPr>
+              <a:t>nclude descriptive error messages in the response body to help clients understand the cause of the error. Ensure error messages are consistent and follow a standardized format.</a:t>
+            </a:r>
+          </a:p>
+          <a:p>
+            <a:endParaRPr lang="en-IN" sz="1600" b="0" i="0" dirty="0">
+              <a:solidFill>
+                <a:srgbClr val="0D0D0D"/>
+              </a:solidFill>
+              <a:effectLst/>
+              <a:highlight>
+                <a:srgbClr val="FFFFFF"/>
+              </a:highlight>
+              <a:latin typeface="Söhne"/>
+            </a:endParaRPr>
+          </a:p>
+          <a:p>
+            <a:pPr marL="285750" indent="-285750">
+              <a:buFont typeface="Arial" panose="020B0604020202020204" pitchFamily="34" charset="0"/>
+              <a:buChar char="•"/>
+            </a:pPr>
+            <a:r>
+              <a:rPr lang="en-IN" sz="1600" b="1" dirty="0">
+                <a:solidFill>
+                  <a:srgbClr val="0D0D0D"/>
+                </a:solidFill>
+                <a:highlight>
+                  <a:srgbClr val="FFFFFF"/>
+                </a:highlight>
+                <a:latin typeface="Söhne"/>
+              </a:rPr>
+              <a:t>Handle Exceptions gracefully:  </a:t>
+            </a:r>
+            <a:r>
+              <a:rPr lang="en-IN" sz="1600" b="0" i="0" dirty="0">
+                <a:solidFill>
+                  <a:srgbClr val="0D0D0D"/>
+                </a:solidFill>
+                <a:effectLst/>
+                <a:highlight>
+                  <a:srgbClr val="FFFFFF"/>
+                </a:highlight>
+                <a:latin typeface="Söhne"/>
+              </a:rPr>
+              <a:t>Catch exceptions and errors within the API codebase.</a:t>
+            </a:r>
+            <a:r>
+              <a:rPr lang="en-IN" sz="1600" b="1" dirty="0">
+                <a:solidFill>
+                  <a:srgbClr val="0D0D0D"/>
+                </a:solidFill>
+                <a:highlight>
+                  <a:srgbClr val="FFFFFF"/>
+                </a:highlight>
+                <a:latin typeface="Söhne"/>
+              </a:rPr>
+              <a:t> </a:t>
+            </a:r>
+            <a:r>
+              <a:rPr lang="en-IN" sz="1600" b="0" i="0" dirty="0">
+                <a:solidFill>
+                  <a:srgbClr val="0D0D0D"/>
+                </a:solidFill>
+                <a:effectLst/>
+                <a:highlight>
+                  <a:srgbClr val="FFFFFF"/>
+                </a:highlight>
+                <a:latin typeface="Söhne"/>
+              </a:rPr>
+              <a:t>Convert exceptions into appropriate HTTP responses with the corresponding status codes and log detailed error information for troubleshooting and debugging purposes.</a:t>
+            </a:r>
+          </a:p>
+          <a:p>
+            <a:pPr marL="285750" indent="-285750">
+              <a:buFont typeface="Arial" panose="020B0604020202020204" pitchFamily="34" charset="0"/>
+              <a:buChar char="•"/>
+            </a:pPr>
+            <a:endParaRPr lang="en-IN" sz="1600" b="0" i="0" dirty="0">
+              <a:solidFill>
+                <a:srgbClr val="0D0D0D"/>
+              </a:solidFill>
+              <a:effectLst/>
+              <a:highlight>
+                <a:srgbClr val="FFFFFF"/>
+              </a:highlight>
+              <a:latin typeface="Söhne"/>
+            </a:endParaRPr>
+          </a:p>
+          <a:p>
+            <a:pPr marL="285750" indent="-285750">
+              <a:buFont typeface="Arial" panose="020B0604020202020204" pitchFamily="34" charset="0"/>
+              <a:buChar char="•"/>
+            </a:pPr>
+            <a:r>
+              <a:rPr lang="en-IN" sz="1600" b="1" dirty="0">
+                <a:solidFill>
+                  <a:srgbClr val="0D0D0D"/>
+                </a:solidFill>
+                <a:highlight>
+                  <a:srgbClr val="FFFFFF"/>
+                </a:highlight>
+                <a:latin typeface="Söhne"/>
+              </a:rPr>
+              <a:t>Handle Unexpected Errors: </a:t>
+            </a:r>
+            <a:r>
+              <a:rPr lang="en-IN" sz="1600" dirty="0">
+                <a:solidFill>
+                  <a:srgbClr val="0D0D0D"/>
+                </a:solidFill>
+                <a:highlight>
+                  <a:srgbClr val="FFFFFF"/>
+                </a:highlight>
+                <a:latin typeface="Söhne"/>
+              </a:rPr>
+              <a:t>Implement a global exception handler to catch unexpected errors and provide a generic error response. Ensure that sensitive information is not exposed in error responses to prevent security vulnerabilities.</a:t>
+            </a:r>
+            <a:endParaRPr lang="en-IN" sz="1600" b="0" i="0" dirty="0">
+              <a:solidFill>
+                <a:srgbClr val="0D0D0D"/>
+              </a:solidFill>
+              <a:effectLst/>
+              <a:highlight>
+                <a:srgbClr val="FFFFFF"/>
+              </a:highlight>
+              <a:latin typeface="Söhne"/>
+            </a:endParaRPr>
+          </a:p>
+          <a:p>
+            <a:pPr marL="285750" indent="-285750">
+              <a:buFont typeface="Arial" panose="020B0604020202020204" pitchFamily="34" charset="0"/>
+              <a:buChar char="•"/>
+            </a:pPr>
+            <a:endParaRPr lang="en-IN" sz="1600" b="0" i="0" dirty="0">
+              <a:solidFill>
+                <a:srgbClr val="0D0D0D"/>
+              </a:solidFill>
+              <a:effectLst/>
+              <a:highlight>
+                <a:srgbClr val="FFFFFF"/>
+              </a:highlight>
+              <a:latin typeface="Söhne"/>
+            </a:endParaRPr>
+          </a:p>
+        </p:txBody>
+      </p:sp>
+      <p:sp>
+        <p:nvSpPr>
+          <p:cNvPr id="16" name="TextBox 15">
+            <a:extLst>
+              <a:ext uri="{FF2B5EF4-FFF2-40B4-BE49-F238E27FC236}">
+                <a16:creationId xmlns:a16="http://schemas.microsoft.com/office/drawing/2014/main" id="{25BEFB78-B54D-9EB6-F9D0-3DC50E9759A5}"/>
+              </a:ext>
+            </a:extLst>
+          </p:cNvPr>
+          <p:cNvSpPr txBox="1"/>
+          <p:nvPr/>
+        </p:nvSpPr>
+        <p:spPr>
+          <a:xfrm>
+            <a:off x="217329" y="5757170"/>
+            <a:ext cx="11580495" cy="584775"/>
+          </a:xfrm>
+          <a:prstGeom prst="rect">
+            <a:avLst/>
+          </a:prstGeom>
+          <a:noFill/>
+        </p:spPr>
+        <p:txBody>
+          <a:bodyPr wrap="square" rtlCol="0">
+            <a:spAutoFit/>
+          </a:bodyPr>
+          <a:lstStyle/>
+          <a:p>
+            <a:r>
+              <a:rPr lang="en-IN" sz="1600" b="0" i="0" dirty="0">
+                <a:solidFill>
+                  <a:srgbClr val="0D0D0D"/>
+                </a:solidFill>
+                <a:effectLst/>
+                <a:highlight>
+                  <a:srgbClr val="FFFFFF"/>
+                </a:highlight>
+                <a:latin typeface="Söhne"/>
+              </a:rPr>
+              <a:t>By implementing robust exception handling mechanisms, you can improve the reliability, usability, and security of your REST APIs, leading to a better developer and user experience.</a:t>
+            </a:r>
+            <a:endParaRPr lang="en-IN" sz="1600" i="0" dirty="0">
+              <a:solidFill>
+                <a:srgbClr val="0D0D0D"/>
+              </a:solidFill>
+              <a:effectLst/>
+              <a:highlight>
+                <a:srgbClr val="FFFFFF"/>
+              </a:highlight>
+              <a:latin typeface="Söhne"/>
+            </a:endParaRPr>
+          </a:p>
+        </p:txBody>
+      </p:sp>
+    </p:spTree>
+    <p:extLst>
+      <p:ext uri="{BB962C8B-B14F-4D97-AF65-F5344CB8AC3E}">
+        <p14:creationId xmlns:p14="http://schemas.microsoft.com/office/powerpoint/2010/main" val="3575767309"/>
       </p:ext>
     </p:extLst>
   </p:cSld>

</xml_diff>